<commit_message>
Panhandle STEM Conference -- final
</commit_message>
<xml_diff>
--- a/STEM-Conference-Scratch.pptx
+++ b/STEM-Conference-Scratch.pptx
@@ -276,7 +276,7 @@
       </p14:sectionLst>
     </p:ext>
     <p:ext uri="{EFAFB233-063F-42B5-8137-9DF3F51BA10A}">
-      <p15:sldGuideLst xmlns="" xmlns:p15="http://schemas.microsoft.com/office/powerpoint/2012/main"/>
+      <p15:sldGuideLst xmlns:p15="http://schemas.microsoft.com/office/powerpoint/2012/main" xmlns=""/>
     </p:ext>
   </p:extLst>
 </p:presentation>
@@ -364,7 +364,7 @@
           <a:p>
             <a:fld id="{5E67A317-6785-4E6D-9F9E-5534567B346A}" type="datetimeFigureOut">
               <a:rPr lang="en-US"/>
-              <a:t>7/23/2018</a:t>
+              <a:t>7/24/2018</a:t>
             </a:fld>
             <a:endParaRPr lang="en-US"/>
           </a:p>
@@ -7265,7 +7265,7 @@
           <a:p>
             <a:fld id="{8986A55C-383D-4E58-8B83-3E04AAA5FB99}" type="datetimeFigureOut">
               <a:rPr lang="en-US" smtClean="0"/>
-              <a:t>7/23/2018</a:t>
+              <a:t>7/24/2018</a:t>
             </a:fld>
             <a:endParaRPr lang="en-US"/>
           </a:p>
@@ -7464,7 +7464,7 @@
           <a:p>
             <a:fld id="{8986A55C-383D-4E58-8B83-3E04AAA5FB99}" type="datetimeFigureOut">
               <a:rPr lang="en-US" smtClean="0"/>
-              <a:t>7/23/2018</a:t>
+              <a:t>7/24/2018</a:t>
             </a:fld>
             <a:endParaRPr lang="en-US"/>
           </a:p>
@@ -7657,7 +7657,7 @@
           <a:p>
             <a:fld id="{8986A55C-383D-4E58-8B83-3E04AAA5FB99}" type="datetimeFigureOut">
               <a:rPr lang="en-US" smtClean="0"/>
-              <a:t>7/23/2018</a:t>
+              <a:t>7/24/2018</a:t>
             </a:fld>
             <a:endParaRPr lang="en-US"/>
           </a:p>
@@ -8130,7 +8130,7 @@
           <a:p>
             <a:fld id="{8986A55C-383D-4E58-8B83-3E04AAA5FB99}" type="datetimeFigureOut">
               <a:rPr lang="en-US" smtClean="0"/>
-              <a:t>7/23/2018</a:t>
+              <a:t>7/24/2018</a:t>
             </a:fld>
             <a:endParaRPr lang="en-US"/>
           </a:p>
@@ -8589,7 +8589,7 @@
           <a:p>
             <a:fld id="{8986A55C-383D-4E58-8B83-3E04AAA5FB99}" type="datetimeFigureOut">
               <a:rPr lang="en-US" smtClean="0"/>
-              <a:t>7/23/2018</a:t>
+              <a:t>7/24/2018</a:t>
             </a:fld>
             <a:endParaRPr lang="en-US"/>
           </a:p>
@@ -8726,7 +8726,7 @@
           <a:p>
             <a:fld id="{8986A55C-383D-4E58-8B83-3E04AAA5FB99}" type="datetimeFigureOut">
               <a:rPr lang="en-US" smtClean="0"/>
-              <a:t>7/23/2018</a:t>
+              <a:t>7/24/2018</a:t>
             </a:fld>
             <a:endParaRPr lang="en-US"/>
           </a:p>
@@ -8840,7 +8840,7 @@
           <a:p>
             <a:fld id="{8986A55C-383D-4E58-8B83-3E04AAA5FB99}" type="datetimeFigureOut">
               <a:rPr lang="en-US" smtClean="0"/>
-              <a:t>7/23/2018</a:t>
+              <a:t>7/24/2018</a:t>
             </a:fld>
             <a:endParaRPr lang="en-US"/>
           </a:p>
@@ -9143,7 +9143,7 @@
           <a:p>
             <a:fld id="{8986A55C-383D-4E58-8B83-3E04AAA5FB99}" type="datetimeFigureOut">
               <a:rPr lang="en-US" smtClean="0"/>
-              <a:t>7/23/2018</a:t>
+              <a:t>7/24/2018</a:t>
             </a:fld>
             <a:endParaRPr lang="en-US"/>
           </a:p>
@@ -9475,7 +9475,7 @@
           <a:p>
             <a:fld id="{8986A55C-383D-4E58-8B83-3E04AAA5FB99}" type="datetimeFigureOut">
               <a:rPr lang="en-US" smtClean="0"/>
-              <a:t>7/23/2018</a:t>
+              <a:t>7/24/2018</a:t>
             </a:fld>
             <a:endParaRPr lang="en-US"/>
           </a:p>
@@ -9707,7 +9707,7 @@
           <a:p>
             <a:fld id="{8986A55C-383D-4E58-8B83-3E04AAA5FB99}" type="datetimeFigureOut">
               <a:rPr lang="en-US" smtClean="0"/>
-              <a:t>7/23/2018</a:t>
+              <a:t>7/24/2018</a:t>
             </a:fld>
             <a:endParaRPr lang="en-US"/>
           </a:p>
@@ -10150,7 +10150,7 @@
   </p:txStyles>
   <p:extLst mod="1">
     <p:ext uri="{27BBF7A9-308A-43DC-89C8-2F10F3537804}">
-      <p15:sldGuideLst xmlns="" xmlns:p15="http://schemas.microsoft.com/office/powerpoint/2012/main">
+      <p15:sldGuideLst xmlns:p15="http://schemas.microsoft.com/office/powerpoint/2012/main" xmlns="">
         <p15:guide id="1" orient="horz" pos="2160">
           <p15:clr>
             <a:srgbClr val="F26B43"/>
@@ -10553,6 +10553,13 @@
       </p:transition>
     </mc:Fallback>
   </mc:AlternateContent>
+  <p:timing>
+    <p:tnLst>
+      <p:par>
+        <p:cTn id="1" dur="indefinite" restart="never" nodeType="tmRoot"/>
+      </p:par>
+    </p:tnLst>
+  </p:timing>
 </p:sld>
 </file>
 
@@ -15154,6 +15161,13 @@
       </p:transition>
     </mc:Fallback>
   </mc:AlternateContent>
+  <p:timing>
+    <p:tnLst>
+      <p:par>
+        <p:cTn id="1" dur="indefinite" restart="never" nodeType="tmRoot"/>
+      </p:par>
+    </p:tnLst>
+  </p:timing>
 </p:sld>
 </file>
 
@@ -18904,6 +18918,13 @@
       </p:transition>
     </mc:Fallback>
   </mc:AlternateContent>
+  <p:timing>
+    <p:tnLst>
+      <p:par>
+        <p:cTn id="1" dur="indefinite" restart="never" nodeType="tmRoot"/>
+      </p:par>
+    </p:tnLst>
+  </p:timing>
 </p:sld>
 </file>
 
@@ -21963,6 +21984,13 @@
       </p:transition>
     </mc:Fallback>
   </mc:AlternateContent>
+  <p:timing>
+    <p:tnLst>
+      <p:par>
+        <p:cTn id="1" dur="indefinite" restart="never" nodeType="tmRoot"/>
+      </p:par>
+    </p:tnLst>
+  </p:timing>
 </p:sld>
 </file>
 
@@ -23580,14 +23608,14 @@
                 <a:gridCol w="1266825">
                   <a:extLst>
                     <a:ext uri="{9D8B030D-6E8A-4147-A177-3AD203B41FA5}">
-                      <a16:colId xmlns="" xmlns:a16="http://schemas.microsoft.com/office/drawing/2014/main" val="20000"/>
+                      <a16:colId xmlns:a16="http://schemas.microsoft.com/office/drawing/2014/main" xmlns="" val="20000"/>
                     </a:ext>
                   </a:extLst>
                 </a:gridCol>
                 <a:gridCol w="5408295">
                   <a:extLst>
                     <a:ext uri="{9D8B030D-6E8A-4147-A177-3AD203B41FA5}">
-                      <a16:colId xmlns="" xmlns:a16="http://schemas.microsoft.com/office/drawing/2014/main" val="20001"/>
+                      <a16:colId xmlns:a16="http://schemas.microsoft.com/office/drawing/2014/main" xmlns="" val="20001"/>
                     </a:ext>
                   </a:extLst>
                 </a:gridCol>
@@ -23627,7 +23655,7 @@
                 </a:tc>
                 <a:extLst>
                   <a:ext uri="{0D108BD9-81ED-4DB2-BD59-A6C34878D82A}">
-                    <a16:rowId xmlns="" xmlns:a16="http://schemas.microsoft.com/office/drawing/2014/main" val="10000"/>
+                    <a16:rowId xmlns:a16="http://schemas.microsoft.com/office/drawing/2014/main" xmlns="" val="10000"/>
                   </a:ext>
                 </a:extLst>
               </a:tr>
@@ -23678,7 +23706,7 @@
                 </a:tc>
                 <a:extLst>
                   <a:ext uri="{0D108BD9-81ED-4DB2-BD59-A6C34878D82A}">
-                    <a16:rowId xmlns="" xmlns:a16="http://schemas.microsoft.com/office/drawing/2014/main" val="10001"/>
+                    <a16:rowId xmlns:a16="http://schemas.microsoft.com/office/drawing/2014/main" xmlns="" val="10001"/>
                   </a:ext>
                 </a:extLst>
               </a:tr>
@@ -23740,7 +23768,7 @@
                 </a:tc>
                 <a:extLst>
                   <a:ext uri="{0D108BD9-81ED-4DB2-BD59-A6C34878D82A}">
-                    <a16:rowId xmlns="" xmlns:a16="http://schemas.microsoft.com/office/drawing/2014/main" val="10002"/>
+                    <a16:rowId xmlns:a16="http://schemas.microsoft.com/office/drawing/2014/main" xmlns="" val="10002"/>
                   </a:ext>
                 </a:extLst>
               </a:tr>
@@ -29874,6 +29902,13 @@
       </p:transition>
     </mc:Fallback>
   </mc:AlternateContent>
+  <p:timing>
+    <p:tnLst>
+      <p:par>
+        <p:cTn id="1" dur="indefinite" restart="never" nodeType="tmRoot"/>
+      </p:par>
+    </p:tnLst>
+  </p:timing>
 </p:sld>
 </file>
 
@@ -29959,15 +29994,19 @@
           <a:p>
             <a:r>
               <a:rPr lang="en-US" altLang="en-US" dirty="0"/>
-              <a:t>Scratch is a visual programming environment where you design/create your interactive stories, games &amp; animations. While </a:t>
-            </a:r>
-            <a:r>
-              <a:rPr lang="en-US" altLang="en-US" dirty="0" err="1"/>
-              <a:t>Scrtach</a:t>
+              <a:t>Scratch is a visual programming environment where you design/create your interactive stories, games &amp; animations. </a:t>
+            </a:r>
+            <a:r>
+              <a:rPr lang="en-US" altLang="en-US"/>
+              <a:t>While </a:t>
+            </a:r>
+            <a:r>
+              <a:rPr lang="en-US" altLang="en-US" smtClean="0"/>
+              <a:t>Scratch </a:t>
             </a:r>
             <a:r>
               <a:rPr lang="en-US" altLang="en-US" dirty="0"/>
-              <a:t> has been designed with a typical 3rd or 4th grader in mind, people of all ages can use it to learn the basics of programming in an enjoyable way! </a:t>
+              <a:t>has been designed with a typical 3rd or 4th grader in mind, people of all ages can use it to learn the basics of programming in an enjoyable way! </a:t>
             </a:r>
             <a:endParaRPr lang="en-US" altLang="en-US" dirty="0" smtClean="0"/>
           </a:p>
@@ -30055,6 +30094,13 @@
       </p:transition>
     </mc:Fallback>
   </mc:AlternateContent>
+  <p:timing>
+    <p:tnLst>
+      <p:par>
+        <p:cTn id="1" dur="indefinite" restart="never" nodeType="tmRoot"/>
+      </p:par>
+    </p:tnLst>
+  </p:timing>
 </p:sld>
 </file>
 
@@ -30233,6 +30279,13 @@
       </p:transition>
     </mc:Fallback>
   </mc:AlternateContent>
+  <p:timing>
+    <p:tnLst>
+      <p:par>
+        <p:cTn id="1" dur="indefinite" restart="never" nodeType="tmRoot"/>
+      </p:par>
+    </p:tnLst>
+  </p:timing>
 </p:sld>
 </file>
 
@@ -30491,7 +30544,7 @@
   <a:extraClrSchemeLst/>
   <a:extLst>
     <a:ext uri="{05A4C25C-085E-4340-85A3-A5531E510DB2}">
-      <thm15:themeFamily xmlns="" xmlns:thm15="http://schemas.microsoft.com/office/thememl/2012/main" name="O15_4109default" id="{E728D685-11FC-4812-BA85-57AC6F9C9F40}" vid="{BC4E008B-95FF-4815-904E-143A8EDFC1D4}"/>
+      <thm15:themeFamily xmlns:thm15="http://schemas.microsoft.com/office/thememl/2012/main" xmlns="" name="O15_4109default" id="{E728D685-11FC-4812-BA85-57AC6F9C9F40}" vid="{BC4E008B-95FF-4815-904E-143A8EDFC1D4}"/>
     </a:ext>
   </a:extLst>
 </a:theme>
@@ -30786,7 +30839,7 @@
   <a:extraClrSchemeLst/>
   <a:extLst>
     <a:ext uri="{05A4C25C-085E-4340-85A3-A5531E510DB2}">
-      <thm15:themeFamily xmlns="" xmlns:thm15="http://schemas.microsoft.com/office/thememl/2012/main" name="Office Theme" id="{62F939B6-93AF-4DB8-9C6B-D6C7DFDC589F}" vid="{4A3C46E8-61CC-4603-A589-7422A47A8E4A}"/>
+      <thm15:themeFamily xmlns:thm15="http://schemas.microsoft.com/office/thememl/2012/main" xmlns="" name="Office Theme" id="{62F939B6-93AF-4DB8-9C6B-D6C7DFDC589F}" vid="{4A3C46E8-61CC-4603-A589-7422A47A8E4A}"/>
     </a:ext>
   </a:extLst>
 </a:theme>

</xml_diff>